<commit_message>
Added Test_Import_v.3 and RAW data for LAB_data and TA_data
</commit_message>
<xml_diff>
--- a/Final_Project_NButaneRecycle.pptx
+++ b/Final_Project_NButaneRecycle.pptx
@@ -14,7 +14,9 @@
     <p:sldId id="270" r:id="rId8"/>
     <p:sldId id="271" r:id="rId9"/>
     <p:sldId id="266" r:id="rId10"/>
-    <p:sldId id="267" r:id="rId11"/>
+    <p:sldId id="272" r:id="rId11"/>
+    <p:sldId id="273" r:id="rId12"/>
+    <p:sldId id="267" r:id="rId13"/>
   </p:sldIdLst>
   <p:sldSz cx="12192000" cy="6858000"/>
   <p:notesSz cx="6858000" cy="9144000"/>
@@ -800,7 +802,7 @@
           <a:p>
             <a:fld id="{5BC34E6C-20FD-4F69-8602-2685E0412272}" type="datetimeFigureOut">
               <a:rPr lang="en-US" smtClean="0"/>
-              <a:t>7/21/2022</a:t>
+              <a:t>7/21/22</a:t>
             </a:fld>
             <a:endParaRPr lang="en-US"/>
           </a:p>
@@ -998,7 +1000,7 @@
           <a:p>
             <a:fld id="{5BC34E6C-20FD-4F69-8602-2685E0412272}" type="datetimeFigureOut">
               <a:rPr lang="en-US" smtClean="0"/>
-              <a:t>7/21/2022</a:t>
+              <a:t>7/21/22</a:t>
             </a:fld>
             <a:endParaRPr lang="en-US"/>
           </a:p>
@@ -1206,7 +1208,7 @@
           <a:p>
             <a:fld id="{5BC34E6C-20FD-4F69-8602-2685E0412272}" type="datetimeFigureOut">
               <a:rPr lang="en-US" smtClean="0"/>
-              <a:t>7/21/2022</a:t>
+              <a:t>7/21/22</a:t>
             </a:fld>
             <a:endParaRPr lang="en-US"/>
           </a:p>
@@ -1404,7 +1406,7 @@
           <a:p>
             <a:fld id="{5BC34E6C-20FD-4F69-8602-2685E0412272}" type="datetimeFigureOut">
               <a:rPr lang="en-US" smtClean="0"/>
-              <a:t>7/21/2022</a:t>
+              <a:t>7/21/22</a:t>
             </a:fld>
             <a:endParaRPr lang="en-US"/>
           </a:p>
@@ -1679,7 +1681,7 @@
           <a:p>
             <a:fld id="{5BC34E6C-20FD-4F69-8602-2685E0412272}" type="datetimeFigureOut">
               <a:rPr lang="en-US" smtClean="0"/>
-              <a:t>7/21/2022</a:t>
+              <a:t>7/21/22</a:t>
             </a:fld>
             <a:endParaRPr lang="en-US"/>
           </a:p>
@@ -1944,7 +1946,7 @@
           <a:p>
             <a:fld id="{5BC34E6C-20FD-4F69-8602-2685E0412272}" type="datetimeFigureOut">
               <a:rPr lang="en-US" smtClean="0"/>
-              <a:t>7/21/2022</a:t>
+              <a:t>7/21/22</a:t>
             </a:fld>
             <a:endParaRPr lang="en-US"/>
           </a:p>
@@ -2356,7 +2358,7 @@
           <a:p>
             <a:fld id="{5BC34E6C-20FD-4F69-8602-2685E0412272}" type="datetimeFigureOut">
               <a:rPr lang="en-US" smtClean="0"/>
-              <a:t>7/21/2022</a:t>
+              <a:t>7/21/22</a:t>
             </a:fld>
             <a:endParaRPr lang="en-US"/>
           </a:p>
@@ -2497,7 +2499,7 @@
           <a:p>
             <a:fld id="{5BC34E6C-20FD-4F69-8602-2685E0412272}" type="datetimeFigureOut">
               <a:rPr lang="en-US" smtClean="0"/>
-              <a:t>7/21/2022</a:t>
+              <a:t>7/21/22</a:t>
             </a:fld>
             <a:endParaRPr lang="en-US"/>
           </a:p>
@@ -2610,7 +2612,7 @@
           <a:p>
             <a:fld id="{5BC34E6C-20FD-4F69-8602-2685E0412272}" type="datetimeFigureOut">
               <a:rPr lang="en-US" smtClean="0"/>
-              <a:t>7/21/2022</a:t>
+              <a:t>7/21/22</a:t>
             </a:fld>
             <a:endParaRPr lang="en-US"/>
           </a:p>
@@ -2921,7 +2923,7 @@
           <a:p>
             <a:fld id="{5BC34E6C-20FD-4F69-8602-2685E0412272}" type="datetimeFigureOut">
               <a:rPr lang="en-US" smtClean="0"/>
-              <a:t>7/21/2022</a:t>
+              <a:t>7/21/22</a:t>
             </a:fld>
             <a:endParaRPr lang="en-US"/>
           </a:p>
@@ -3209,7 +3211,7 @@
           <a:p>
             <a:fld id="{5BC34E6C-20FD-4F69-8602-2685E0412272}" type="datetimeFigureOut">
               <a:rPr lang="en-US" smtClean="0"/>
-              <a:t>7/21/2022</a:t>
+              <a:t>7/21/22</a:t>
             </a:fld>
             <a:endParaRPr lang="en-US"/>
           </a:p>
@@ -3450,7 +3452,7 @@
           <a:p>
             <a:fld id="{5BC34E6C-20FD-4F69-8602-2685E0412272}" type="datetimeFigureOut">
               <a:rPr lang="en-US" smtClean="0"/>
-              <a:t>7/21/2022</a:t>
+              <a:t>7/21/22</a:t>
             </a:fld>
             <a:endParaRPr lang="en-US"/>
           </a:p>
@@ -4122,6 +4124,391 @@
           <p:cNvPr id="2" name="Title 1">
             <a:extLst>
               <a:ext uri="{FF2B5EF4-FFF2-40B4-BE49-F238E27FC236}">
+                <a16:creationId xmlns:a16="http://schemas.microsoft.com/office/drawing/2014/main" id="{B0BE5729-7542-46B5-868C-96C4B4171CEB}"/>
+              </a:ext>
+            </a:extLst>
+          </p:cNvPr>
+          <p:cNvSpPr>
+            <a:spLocks noGrp="1"/>
+          </p:cNvSpPr>
+          <p:nvPr>
+            <p:ph type="title"/>
+          </p:nvPr>
+        </p:nvSpPr>
+        <p:spPr/>
+        <p:txBody>
+          <a:bodyPr/>
+          <a:lstStyle/>
+          <a:p>
+            <a:r>
+              <a:rPr lang="en-US" dirty="0"/>
+              <a:t>Project Scope / Plan</a:t>
+            </a:r>
+          </a:p>
+        </p:txBody>
+      </p:sp>
+      <p:sp>
+        <p:nvSpPr>
+          <p:cNvPr id="3" name="Content Placeholder 2">
+            <a:extLst>
+              <a:ext uri="{FF2B5EF4-FFF2-40B4-BE49-F238E27FC236}">
+                <a16:creationId xmlns:a16="http://schemas.microsoft.com/office/drawing/2014/main" id="{1FA31458-7C79-4A3E-BFB5-0608914CFC02}"/>
+              </a:ext>
+            </a:extLst>
+          </p:cNvPr>
+          <p:cNvSpPr>
+            <a:spLocks noGrp="1"/>
+          </p:cNvSpPr>
+          <p:nvPr>
+            <p:ph idx="1"/>
+          </p:nvPr>
+        </p:nvSpPr>
+        <p:spPr>
+          <a:xfrm>
+            <a:off x="838200" y="1400537"/>
+            <a:ext cx="10515600" cy="5092338"/>
+          </a:xfrm>
+        </p:spPr>
+        <p:txBody>
+          <a:bodyPr>
+            <a:normAutofit lnSpcReduction="10000"/>
+          </a:bodyPr>
+          <a:lstStyle/>
+          <a:p>
+            <a:r>
+              <a:rPr lang="en-US" dirty="0"/>
+              <a:t>20.1 (Due 7/31): Sketch it Out: </a:t>
+            </a:r>
+            <a:r>
+              <a:rPr lang="en-US" sz="1800" dirty="0"/>
+              <a:t>Decide on Project, Select Question, Build Simple Model, Connect to fabricated DB using CSV or JSON to prototype idea. </a:t>
+            </a:r>
+          </a:p>
+          <a:p>
+            <a:r>
+              <a:rPr lang="en-US" sz="1800" dirty="0"/>
+              <a:t>Deliverables:</a:t>
+            </a:r>
+          </a:p>
+          <a:p>
+            <a:pPr>
+              <a:buFontTx/>
+              <a:buChar char="-"/>
+            </a:pPr>
+            <a:r>
+              <a:rPr lang="en-US" sz="1100" dirty="0"/>
+              <a:t>Readme – Presentation</a:t>
+            </a:r>
+          </a:p>
+          <a:p>
+            <a:pPr>
+              <a:buFontTx/>
+              <a:buChar char="-"/>
+            </a:pPr>
+            <a:r>
+              <a:rPr lang="en-US" sz="1100" dirty="0"/>
+              <a:t>GitHub One branch per member, 4 commits per member</a:t>
+            </a:r>
+          </a:p>
+          <a:p>
+            <a:pPr>
+              <a:buFontTx/>
+              <a:buChar char="-"/>
+            </a:pPr>
+            <a:r>
+              <a:rPr lang="en-US" sz="1100" dirty="0"/>
+              <a:t>ML  Model  works</a:t>
+            </a:r>
+          </a:p>
+          <a:p>
+            <a:pPr>
+              <a:buFontTx/>
+              <a:buChar char="-"/>
+            </a:pPr>
+            <a:r>
+              <a:rPr lang="en-US" sz="1100" dirty="0"/>
+              <a:t>Provisional Database </a:t>
+            </a:r>
+          </a:p>
+          <a:p>
+            <a:r>
+              <a:rPr lang="en-US" dirty="0"/>
+              <a:t>Clean Data for TA and LAB Pass 1 (scripts / outliers / datatype) </a:t>
+            </a:r>
+          </a:p>
+          <a:p>
+            <a:r>
+              <a:rPr lang="en-US" dirty="0"/>
+              <a:t>Plug in and test Linear Regression (discuss other models) </a:t>
+            </a:r>
+          </a:p>
+          <a:p>
+            <a:r>
+              <a:rPr lang="en-US" dirty="0"/>
+              <a:t>Clean Data for TA and LAB Pass 2 (Binary Qualifier, Standardize)  </a:t>
+            </a:r>
+          </a:p>
+          <a:p>
+            <a:r>
+              <a:rPr lang="en-US" dirty="0"/>
+              <a:t>Narrow Input Data (PCA, Feature Importance (Module 17))</a:t>
+            </a:r>
+          </a:p>
+          <a:p>
+            <a:r>
+              <a:rPr lang="en-US" dirty="0"/>
+              <a:t>Pull second data source (API / CSV / etc..) </a:t>
+            </a:r>
+          </a:p>
+          <a:p>
+            <a:r>
+              <a:rPr lang="en-US" dirty="0"/>
+              <a:t>Practice SQL (merging DB, pull into Python)</a:t>
+            </a:r>
+          </a:p>
+          <a:p>
+            <a:endParaRPr lang="en-US" dirty="0"/>
+          </a:p>
+          <a:p>
+            <a:endParaRPr lang="en-US" dirty="0"/>
+          </a:p>
+          <a:p>
+            <a:endParaRPr lang="en-US" dirty="0"/>
+          </a:p>
+          <a:p>
+            <a:endParaRPr lang="en-US" dirty="0"/>
+          </a:p>
+        </p:txBody>
+      </p:sp>
+    </p:spTree>
+    <p:extLst>
+      <p:ext uri="{BB962C8B-B14F-4D97-AF65-F5344CB8AC3E}">
+        <p14:creationId xmlns:p14="http://schemas.microsoft.com/office/powerpoint/2010/main" val="2893789216"/>
+      </p:ext>
+    </p:extLst>
+  </p:cSld>
+  <p:clrMapOvr>
+    <a:masterClrMapping/>
+  </p:clrMapOvr>
+</p:sld>
+</file>
+
+<file path=ppt/slides/slide11.xml><?xml version="1.0" encoding="utf-8"?>
+<p:sld xmlns:a="http://schemas.openxmlformats.org/drawingml/2006/main" xmlns:r="http://schemas.openxmlformats.org/officeDocument/2006/relationships" xmlns:p="http://schemas.openxmlformats.org/presentationml/2006/main">
+  <p:cSld>
+    <p:spTree>
+      <p:nvGrpSpPr>
+        <p:cNvPr id="1" name=""/>
+        <p:cNvGrpSpPr/>
+        <p:nvPr/>
+      </p:nvGrpSpPr>
+      <p:grpSpPr>
+        <a:xfrm>
+          <a:off x="0" y="0"/>
+          <a:ext cx="0" cy="0"/>
+          <a:chOff x="0" y="0"/>
+          <a:chExt cx="0" cy="0"/>
+        </a:xfrm>
+      </p:grpSpPr>
+      <p:sp>
+        <p:nvSpPr>
+          <p:cNvPr id="2" name="Title 1">
+            <a:extLst>
+              <a:ext uri="{FF2B5EF4-FFF2-40B4-BE49-F238E27FC236}">
+                <a16:creationId xmlns:a16="http://schemas.microsoft.com/office/drawing/2014/main" id="{B0BE5729-7542-46B5-868C-96C4B4171CEB}"/>
+              </a:ext>
+            </a:extLst>
+          </p:cNvPr>
+          <p:cNvSpPr>
+            <a:spLocks noGrp="1"/>
+          </p:cNvSpPr>
+          <p:nvPr>
+            <p:ph type="title"/>
+          </p:nvPr>
+        </p:nvSpPr>
+        <p:spPr/>
+        <p:txBody>
+          <a:bodyPr/>
+          <a:lstStyle/>
+          <a:p>
+            <a:r>
+              <a:rPr lang="en-US" dirty="0"/>
+              <a:t>Project Scope / Plan</a:t>
+            </a:r>
+          </a:p>
+        </p:txBody>
+      </p:sp>
+      <p:sp>
+        <p:nvSpPr>
+          <p:cNvPr id="3" name="Content Placeholder 2">
+            <a:extLst>
+              <a:ext uri="{FF2B5EF4-FFF2-40B4-BE49-F238E27FC236}">
+                <a16:creationId xmlns:a16="http://schemas.microsoft.com/office/drawing/2014/main" id="{1FA31458-7C79-4A3E-BFB5-0608914CFC02}"/>
+              </a:ext>
+            </a:extLst>
+          </p:cNvPr>
+          <p:cNvSpPr>
+            <a:spLocks noGrp="1"/>
+          </p:cNvSpPr>
+          <p:nvPr>
+            <p:ph idx="1"/>
+          </p:nvPr>
+        </p:nvSpPr>
+        <p:spPr/>
+        <p:txBody>
+          <a:bodyPr>
+            <a:normAutofit/>
+          </a:bodyPr>
+          <a:lstStyle/>
+          <a:p>
+            <a:r>
+              <a:rPr lang="en-US" dirty="0"/>
+              <a:t>20.2 (Due 8/7): Build the Pieces: Train model and sketch out permanent database</a:t>
+            </a:r>
+          </a:p>
+          <a:p>
+            <a:pPr>
+              <a:buFontTx/>
+              <a:buChar char="-"/>
+            </a:pPr>
+            <a:r>
+              <a:rPr lang="en-US" sz="1100" b="1" dirty="0"/>
+              <a:t>Deliverables:</a:t>
+            </a:r>
+          </a:p>
+          <a:p>
+            <a:pPr>
+              <a:buFontTx/>
+              <a:buChar char="-"/>
+            </a:pPr>
+            <a:r>
+              <a:rPr lang="en-US" sz="1100" dirty="0"/>
+              <a:t>Readme – Presentation</a:t>
+            </a:r>
+          </a:p>
+          <a:p>
+            <a:pPr>
+              <a:buFontTx/>
+              <a:buChar char="-"/>
+            </a:pPr>
+            <a:r>
+              <a:rPr lang="en-US" sz="1100" dirty="0"/>
+              <a:t>GitHub One branch per member, 4 commits per member, code works</a:t>
+            </a:r>
+          </a:p>
+          <a:p>
+            <a:pPr>
+              <a:buFontTx/>
+              <a:buChar char="-"/>
+            </a:pPr>
+            <a:r>
+              <a:rPr lang="en-US" sz="1100" dirty="0"/>
+              <a:t>ML  Model  works</a:t>
+            </a:r>
+          </a:p>
+          <a:p>
+            <a:pPr>
+              <a:buFontTx/>
+              <a:buChar char="-"/>
+            </a:pPr>
+            <a:r>
+              <a:rPr lang="en-US" sz="1100" dirty="0"/>
+              <a:t>Database Complete</a:t>
+            </a:r>
+          </a:p>
+          <a:p>
+            <a:pPr>
+              <a:buFontTx/>
+              <a:buChar char="-"/>
+            </a:pPr>
+            <a:r>
+              <a:rPr lang="en-US" sz="1100" dirty="0"/>
+              <a:t>Blueprint for dashboard</a:t>
+            </a:r>
+          </a:p>
+          <a:p>
+            <a:pPr>
+              <a:buFontTx/>
+              <a:buChar char="-"/>
+            </a:pPr>
+            <a:endParaRPr lang="en-US" sz="1100" dirty="0"/>
+          </a:p>
+          <a:p>
+            <a:pPr>
+              <a:buFontTx/>
+              <a:buChar char="-"/>
+            </a:pPr>
+            <a:r>
+              <a:rPr lang="en-US" sz="1100" dirty="0"/>
+              <a:t>Selected and confirmed model type – it works</a:t>
+            </a:r>
+          </a:p>
+          <a:p>
+            <a:pPr>
+              <a:buFontTx/>
+              <a:buChar char="-"/>
+            </a:pPr>
+            <a:r>
+              <a:rPr lang="en-US" sz="1100" dirty="0"/>
+              <a:t>Complete SQL portion of project / load the data </a:t>
+            </a:r>
+          </a:p>
+          <a:p>
+            <a:pPr>
+              <a:buFontTx/>
+              <a:buChar char="-"/>
+            </a:pPr>
+            <a:r>
+              <a:rPr lang="en-US" sz="1100" dirty="0"/>
+              <a:t>Blue print for flask app</a:t>
+            </a:r>
+          </a:p>
+          <a:p>
+            <a:endParaRPr lang="en-US" dirty="0"/>
+          </a:p>
+          <a:p>
+            <a:endParaRPr lang="en-US" dirty="0"/>
+          </a:p>
+          <a:p>
+            <a:endParaRPr lang="en-US" dirty="0"/>
+          </a:p>
+        </p:txBody>
+      </p:sp>
+    </p:spTree>
+    <p:extLst>
+      <p:ext uri="{BB962C8B-B14F-4D97-AF65-F5344CB8AC3E}">
+        <p14:creationId xmlns:p14="http://schemas.microsoft.com/office/powerpoint/2010/main" val="2263705149"/>
+      </p:ext>
+    </p:extLst>
+  </p:cSld>
+  <p:clrMapOvr>
+    <a:masterClrMapping/>
+  </p:clrMapOvr>
+</p:sld>
+</file>
+
+<file path=ppt/slides/slide12.xml><?xml version="1.0" encoding="utf-8"?>
+<p:sld xmlns:a="http://schemas.openxmlformats.org/drawingml/2006/main" xmlns:r="http://schemas.openxmlformats.org/officeDocument/2006/relationships" xmlns:p="http://schemas.openxmlformats.org/presentationml/2006/main">
+  <p:cSld>
+    <p:spTree>
+      <p:nvGrpSpPr>
+        <p:cNvPr id="1" name=""/>
+        <p:cNvGrpSpPr/>
+        <p:nvPr/>
+      </p:nvGrpSpPr>
+      <p:grpSpPr>
+        <a:xfrm>
+          <a:off x="0" y="0"/>
+          <a:ext cx="0" cy="0"/>
+          <a:chOff x="0" y="0"/>
+          <a:chExt cx="0" cy="0"/>
+        </a:xfrm>
+      </p:grpSpPr>
+      <p:sp>
+        <p:nvSpPr>
+          <p:cNvPr id="2" name="Title 1">
+            <a:extLst>
+              <a:ext uri="{FF2B5EF4-FFF2-40B4-BE49-F238E27FC236}">
                 <a16:creationId xmlns:a16="http://schemas.microsoft.com/office/drawing/2014/main" id="{A0C436D3-E6C7-4264-8060-86B7EB556F96}"/>
               </a:ext>
             </a:extLst>

</xml_diff>